<commit_message>
new spatial activity with clonal depth pic
</commit_message>
<xml_diff>
--- a/docs/splnproc1703/Figures-dev/SpatialActivity.pptx
+++ b/docs/splnproc1703/Figures-dev/SpatialActivity.pptx
@@ -3885,10 +3885,10 @@
       </p:pic>
       <p:pic>
         <p:nvPicPr>
-          <p:cNvPr id="11" name="Picture 10">
+          <p:cNvPr id="13" name="Picture 12">
             <a:extLst>
               <a:ext uri="{FF2B5EF4-FFF2-40B4-BE49-F238E27FC236}">
-                <a16:creationId xmlns:a16="http://schemas.microsoft.com/office/drawing/2014/main" id="{62197176-AEA0-B641-836D-0C4DB400C319}"/>
+                <a16:creationId xmlns:a16="http://schemas.microsoft.com/office/drawing/2014/main" id="{6089858A-5DB1-9A4E-B5C3-5CBC409EFEBA}"/>
               </a:ext>
             </a:extLst>
           </p:cNvPr>
@@ -3905,25 +3905,168 @@
         </p:blipFill>
         <p:spPr>
           <a:xfrm>
-            <a:off x="1320800" y="2512060"/>
-            <a:ext cx="2011680" cy="2011680"/>
+            <a:off x="3926308" y="2512060"/>
+            <a:ext cx="2019569" cy="2011680"/>
           </a:xfrm>
           <a:prstGeom prst="rect">
             <a:avLst/>
           </a:prstGeom>
-          <a:ln>
-            <a:solidFill>
-              <a:schemeClr val="tx1"/>
-            </a:solidFill>
-          </a:ln>
         </p:spPr>
       </p:pic>
+      <p:sp>
+        <p:nvSpPr>
+          <p:cNvPr id="14" name="TextBox 13">
+            <a:extLst>
+              <a:ext uri="{FF2B5EF4-FFF2-40B4-BE49-F238E27FC236}">
+                <a16:creationId xmlns:a16="http://schemas.microsoft.com/office/drawing/2014/main" id="{A8439637-5B41-D94C-8F01-092F8D3ABCC8}"/>
+              </a:ext>
+            </a:extLst>
+          </p:cNvPr>
+          <p:cNvSpPr txBox="1"/>
+          <p:nvPr/>
+        </p:nvSpPr>
+        <p:spPr>
+          <a:xfrm>
+            <a:off x="949384" y="177800"/>
+            <a:ext cx="325730" cy="307777"/>
+          </a:xfrm>
+          <a:prstGeom prst="rect">
+            <a:avLst/>
+          </a:prstGeom>
+          <a:solidFill>
+            <a:schemeClr val="bg1"/>
+          </a:solidFill>
+        </p:spPr>
+        <p:txBody>
+          <a:bodyPr wrap="none" rtlCol="0">
+            <a:spAutoFit/>
+          </a:bodyPr>
+          <a:lstStyle/>
+          <a:p>
+            <a:r>
+              <a:rPr lang="en-US" sz="1400" dirty="0"/>
+              <a:t>a)</a:t>
+            </a:r>
+          </a:p>
+        </p:txBody>
+      </p:sp>
+      <p:sp>
+        <p:nvSpPr>
+          <p:cNvPr id="25" name="TextBox 24">
+            <a:extLst>
+              <a:ext uri="{FF2B5EF4-FFF2-40B4-BE49-F238E27FC236}">
+                <a16:creationId xmlns:a16="http://schemas.microsoft.com/office/drawing/2014/main" id="{8F857C16-16AE-AC47-AC88-096B87829FDD}"/>
+              </a:ext>
+            </a:extLst>
+          </p:cNvPr>
+          <p:cNvSpPr txBox="1"/>
+          <p:nvPr/>
+        </p:nvSpPr>
+        <p:spPr>
+          <a:xfrm>
+            <a:off x="3535634" y="177800"/>
+            <a:ext cx="333746" cy="307777"/>
+          </a:xfrm>
+          <a:prstGeom prst="rect">
+            <a:avLst/>
+          </a:prstGeom>
+          <a:solidFill>
+            <a:schemeClr val="bg1"/>
+          </a:solidFill>
+        </p:spPr>
+        <p:txBody>
+          <a:bodyPr wrap="none" rtlCol="0">
+            <a:spAutoFit/>
+          </a:bodyPr>
+          <a:lstStyle/>
+          <a:p>
+            <a:r>
+              <a:rPr lang="en-US" sz="1400" dirty="0"/>
+              <a:t>b)</a:t>
+            </a:r>
+          </a:p>
+        </p:txBody>
+      </p:sp>
+      <p:sp>
+        <p:nvSpPr>
+          <p:cNvPr id="26" name="TextBox 25">
+            <a:extLst>
+              <a:ext uri="{FF2B5EF4-FFF2-40B4-BE49-F238E27FC236}">
+                <a16:creationId xmlns:a16="http://schemas.microsoft.com/office/drawing/2014/main" id="{255799CA-9648-0648-B770-71FE4A44E29F}"/>
+              </a:ext>
+            </a:extLst>
+          </p:cNvPr>
+          <p:cNvSpPr txBox="1"/>
+          <p:nvPr/>
+        </p:nvSpPr>
+        <p:spPr>
+          <a:xfrm>
+            <a:off x="949384" y="2512060"/>
+            <a:ext cx="314510" cy="307777"/>
+          </a:xfrm>
+          <a:prstGeom prst="rect">
+            <a:avLst/>
+          </a:prstGeom>
+          <a:solidFill>
+            <a:schemeClr val="bg1"/>
+          </a:solidFill>
+        </p:spPr>
+        <p:txBody>
+          <a:bodyPr wrap="none" rtlCol="0">
+            <a:spAutoFit/>
+          </a:bodyPr>
+          <a:lstStyle/>
+          <a:p>
+            <a:r>
+              <a:rPr lang="en-US" sz="1400" dirty="0"/>
+              <a:t>c)</a:t>
+            </a:r>
+          </a:p>
+        </p:txBody>
+      </p:sp>
+      <p:sp>
+        <p:nvSpPr>
+          <p:cNvPr id="27" name="TextBox 26">
+            <a:extLst>
+              <a:ext uri="{FF2B5EF4-FFF2-40B4-BE49-F238E27FC236}">
+                <a16:creationId xmlns:a16="http://schemas.microsoft.com/office/drawing/2014/main" id="{861E6DFE-F410-814A-BAE1-23BA38690491}"/>
+              </a:ext>
+            </a:extLst>
+          </p:cNvPr>
+          <p:cNvSpPr txBox="1"/>
+          <p:nvPr/>
+        </p:nvSpPr>
+        <p:spPr>
+          <a:xfrm>
+            <a:off x="3549282" y="2512060"/>
+            <a:ext cx="333746" cy="307777"/>
+          </a:xfrm>
+          <a:prstGeom prst="rect">
+            <a:avLst/>
+          </a:prstGeom>
+          <a:solidFill>
+            <a:schemeClr val="bg1"/>
+          </a:solidFill>
+        </p:spPr>
+        <p:txBody>
+          <a:bodyPr wrap="none" rtlCol="0">
+            <a:spAutoFit/>
+          </a:bodyPr>
+          <a:lstStyle/>
+          <a:p>
+            <a:r>
+              <a:rPr lang="en-US" sz="1400" dirty="0"/>
+              <a:t>d)</a:t>
+            </a:r>
+          </a:p>
+        </p:txBody>
+      </p:sp>
       <p:pic>
         <p:nvPicPr>
-          <p:cNvPr id="13" name="Picture 12">
+          <p:cNvPr id="16" name="Picture 15">
             <a:extLst>
               <a:ext uri="{FF2B5EF4-FFF2-40B4-BE49-F238E27FC236}">
-                <a16:creationId xmlns:a16="http://schemas.microsoft.com/office/drawing/2014/main" id="{6089858A-5DB1-9A4E-B5C3-5CBC409EFEBA}"/>
+                <a16:creationId xmlns:a16="http://schemas.microsoft.com/office/drawing/2014/main" id="{4E504FC2-B0E5-4743-A8E5-05586FAAA7A4}"/>
               </a:ext>
             </a:extLst>
           </p:cNvPr>
@@ -3940,162 +4083,14 @@
         </p:blipFill>
         <p:spPr>
           <a:xfrm>
-            <a:off x="3926308" y="2512060"/>
-            <a:ext cx="2019569" cy="2011680"/>
+            <a:off x="1311656" y="2512060"/>
+            <a:ext cx="2029968" cy="2026003"/>
           </a:xfrm>
           <a:prstGeom prst="rect">
             <a:avLst/>
           </a:prstGeom>
         </p:spPr>
       </p:pic>
-      <p:sp>
-        <p:nvSpPr>
-          <p:cNvPr id="14" name="TextBox 13">
-            <a:extLst>
-              <a:ext uri="{FF2B5EF4-FFF2-40B4-BE49-F238E27FC236}">
-                <a16:creationId xmlns:a16="http://schemas.microsoft.com/office/drawing/2014/main" id="{A8439637-5B41-D94C-8F01-092F8D3ABCC8}"/>
-              </a:ext>
-            </a:extLst>
-          </p:cNvPr>
-          <p:cNvSpPr txBox="1"/>
-          <p:nvPr/>
-        </p:nvSpPr>
-        <p:spPr>
-          <a:xfrm>
-            <a:off x="949384" y="177800"/>
-            <a:ext cx="365806" cy="369332"/>
-          </a:xfrm>
-          <a:prstGeom prst="rect">
-            <a:avLst/>
-          </a:prstGeom>
-          <a:solidFill>
-            <a:schemeClr val="bg1"/>
-          </a:solidFill>
-        </p:spPr>
-        <p:txBody>
-          <a:bodyPr wrap="none" rtlCol="0">
-            <a:spAutoFit/>
-          </a:bodyPr>
-          <a:lstStyle/>
-          <a:p>
-            <a:r>
-              <a:rPr lang="en-US" dirty="0"/>
-              <a:t>a)</a:t>
-            </a:r>
-          </a:p>
-        </p:txBody>
-      </p:sp>
-      <p:sp>
-        <p:nvSpPr>
-          <p:cNvPr id="25" name="TextBox 24">
-            <a:extLst>
-              <a:ext uri="{FF2B5EF4-FFF2-40B4-BE49-F238E27FC236}">
-                <a16:creationId xmlns:a16="http://schemas.microsoft.com/office/drawing/2014/main" id="{8F857C16-16AE-AC47-AC88-096B87829FDD}"/>
-              </a:ext>
-            </a:extLst>
-          </p:cNvPr>
-          <p:cNvSpPr txBox="1"/>
-          <p:nvPr/>
-        </p:nvSpPr>
-        <p:spPr>
-          <a:xfrm>
-            <a:off x="3535634" y="177800"/>
-            <a:ext cx="377026" cy="369332"/>
-          </a:xfrm>
-          <a:prstGeom prst="rect">
-            <a:avLst/>
-          </a:prstGeom>
-          <a:solidFill>
-            <a:schemeClr val="bg1"/>
-          </a:solidFill>
-        </p:spPr>
-        <p:txBody>
-          <a:bodyPr wrap="none" rtlCol="0">
-            <a:spAutoFit/>
-          </a:bodyPr>
-          <a:lstStyle/>
-          <a:p>
-            <a:r>
-              <a:rPr lang="en-US" dirty="0"/>
-              <a:t>b)</a:t>
-            </a:r>
-          </a:p>
-        </p:txBody>
-      </p:sp>
-      <p:sp>
-        <p:nvSpPr>
-          <p:cNvPr id="26" name="TextBox 25">
-            <a:extLst>
-              <a:ext uri="{FF2B5EF4-FFF2-40B4-BE49-F238E27FC236}">
-                <a16:creationId xmlns:a16="http://schemas.microsoft.com/office/drawing/2014/main" id="{255799CA-9648-0648-B770-71FE4A44E29F}"/>
-              </a:ext>
-            </a:extLst>
-          </p:cNvPr>
-          <p:cNvSpPr txBox="1"/>
-          <p:nvPr/>
-        </p:nvSpPr>
-        <p:spPr>
-          <a:xfrm>
-            <a:off x="949384" y="2512060"/>
-            <a:ext cx="365806" cy="369332"/>
-          </a:xfrm>
-          <a:prstGeom prst="rect">
-            <a:avLst/>
-          </a:prstGeom>
-          <a:solidFill>
-            <a:schemeClr val="bg1"/>
-          </a:solidFill>
-        </p:spPr>
-        <p:txBody>
-          <a:bodyPr wrap="none" rtlCol="0">
-            <a:spAutoFit/>
-          </a:bodyPr>
-          <a:lstStyle/>
-          <a:p>
-            <a:r>
-              <a:rPr lang="en-US" dirty="0"/>
-              <a:t>c)</a:t>
-            </a:r>
-          </a:p>
-        </p:txBody>
-      </p:sp>
-      <p:sp>
-        <p:nvSpPr>
-          <p:cNvPr id="27" name="TextBox 26">
-            <a:extLst>
-              <a:ext uri="{FF2B5EF4-FFF2-40B4-BE49-F238E27FC236}">
-                <a16:creationId xmlns:a16="http://schemas.microsoft.com/office/drawing/2014/main" id="{861E6DFE-F410-814A-BAE1-23BA38690491}"/>
-              </a:ext>
-            </a:extLst>
-          </p:cNvPr>
-          <p:cNvSpPr txBox="1"/>
-          <p:nvPr/>
-        </p:nvSpPr>
-        <p:spPr>
-          <a:xfrm>
-            <a:off x="3549282" y="2512060"/>
-            <a:ext cx="377026" cy="369332"/>
-          </a:xfrm>
-          <a:prstGeom prst="rect">
-            <a:avLst/>
-          </a:prstGeom>
-          <a:solidFill>
-            <a:schemeClr val="bg1"/>
-          </a:solidFill>
-        </p:spPr>
-        <p:txBody>
-          <a:bodyPr wrap="none" rtlCol="0">
-            <a:spAutoFit/>
-          </a:bodyPr>
-          <a:lstStyle/>
-          <a:p>
-            <a:r>
-              <a:rPr lang="en-US" dirty="0"/>
-              <a:t>d)</a:t>
-            </a:r>
-          </a:p>
-        </p:txBody>
-      </p:sp>
     </p:spTree>
     <p:extLst>
       <p:ext uri="{BB962C8B-B14F-4D97-AF65-F5344CB8AC3E}">

</xml_diff>

<commit_message>
grey background for spatial patterns and clonal depth
</commit_message>
<xml_diff>
--- a/docs/splnproc1703/Figures-dev/SpatialActivity.pptx
+++ b/docs/splnproc1703/Figures-dev/SpatialActivity.pptx
@@ -3835,12 +3835,18 @@
         </p:blipFill>
         <p:spPr>
           <a:xfrm>
-            <a:off x="1320800" y="177800"/>
+            <a:off x="3883028" y="209538"/>
             <a:ext cx="2011680" cy="2011680"/>
           </a:xfrm>
           <a:prstGeom prst="rect">
             <a:avLst/>
           </a:prstGeom>
+          <a:solidFill>
+            <a:schemeClr val="bg1">
+              <a:lumMod val="75000"/>
+              <a:alpha val="74000"/>
+            </a:schemeClr>
+          </a:solidFill>
           <a:ln>
             <a:solidFill>
               <a:schemeClr val="tx1"/>
@@ -3870,12 +3876,18 @@
         </p:blipFill>
         <p:spPr>
           <a:xfrm>
-            <a:off x="3926308" y="177800"/>
+            <a:off x="1329944" y="209538"/>
             <a:ext cx="2011680" cy="2011680"/>
           </a:xfrm>
           <a:prstGeom prst="rect">
             <a:avLst/>
           </a:prstGeom>
+          <a:solidFill>
+            <a:schemeClr val="bg1">
+              <a:lumMod val="75000"/>
+              <a:alpha val="75000"/>
+            </a:schemeClr>
+          </a:solidFill>
           <a:ln>
             <a:solidFill>
               <a:schemeClr val="tx1"/>
@@ -3905,7 +3917,7 @@
         </p:blipFill>
         <p:spPr>
           <a:xfrm>
-            <a:off x="3926308" y="2512060"/>
+            <a:off x="3883028" y="2512060"/>
             <a:ext cx="2019569" cy="2011680"/>
           </a:xfrm>
           <a:prstGeom prst="rect">
@@ -4089,6 +4101,12 @@
           <a:prstGeom prst="rect">
             <a:avLst/>
           </a:prstGeom>
+          <a:solidFill>
+            <a:schemeClr val="bg1">
+              <a:lumMod val="75000"/>
+              <a:alpha val="74000"/>
+            </a:schemeClr>
+          </a:solidFill>
         </p:spPr>
       </p:pic>
     </p:spTree>

</xml_diff>

<commit_message>
Submission version. Converted 16:9 movies. References still need a bit of work, otherwise finished.
</commit_message>
<xml_diff>
--- a/docs/splnproc1703/Figures-dev/SpatialActivity.pptx
+++ b/docs/splnproc1703/Figures-dev/SpatialActivity.pptx
@@ -199,7 +199,7 @@
           <a:p>
             <a:fld id="{9DF8E8A1-7F5E-B946-B0BF-5A810BC7CA04}" type="datetimeFigureOut">
               <a:rPr lang="en-US" smtClean="0"/>
-              <a:t>9/27/19</a:t>
+              <a:t>9/28/19</a:t>
             </a:fld>
             <a:endParaRPr lang="en-US"/>
           </a:p>
@@ -597,7 +597,7 @@
           <a:p>
             <a:fld id="{B3C8DAF2-8992-D940-951E-CD71294AEB5F}" type="datetimeFigureOut">
               <a:rPr lang="en-US" smtClean="0"/>
-              <a:t>9/27/19</a:t>
+              <a:t>9/28/19</a:t>
             </a:fld>
             <a:endParaRPr lang="en-US"/>
           </a:p>
@@ -767,7 +767,7 @@
           <a:p>
             <a:fld id="{B3C8DAF2-8992-D940-951E-CD71294AEB5F}" type="datetimeFigureOut">
               <a:rPr lang="en-US" smtClean="0"/>
-              <a:t>9/27/19</a:t>
+              <a:t>9/28/19</a:t>
             </a:fld>
             <a:endParaRPr lang="en-US"/>
           </a:p>
@@ -947,7 +947,7 @@
           <a:p>
             <a:fld id="{B3C8DAF2-8992-D940-951E-CD71294AEB5F}" type="datetimeFigureOut">
               <a:rPr lang="en-US" smtClean="0"/>
-              <a:t>9/27/19</a:t>
+              <a:t>9/28/19</a:t>
             </a:fld>
             <a:endParaRPr lang="en-US"/>
           </a:p>
@@ -1117,7 +1117,7 @@
           <a:p>
             <a:fld id="{B3C8DAF2-8992-D940-951E-CD71294AEB5F}" type="datetimeFigureOut">
               <a:rPr lang="en-US" smtClean="0"/>
-              <a:t>9/27/19</a:t>
+              <a:t>9/28/19</a:t>
             </a:fld>
             <a:endParaRPr lang="en-US"/>
           </a:p>
@@ -1361,7 +1361,7 @@
           <a:p>
             <a:fld id="{B3C8DAF2-8992-D940-951E-CD71294AEB5F}" type="datetimeFigureOut">
               <a:rPr lang="en-US" smtClean="0"/>
-              <a:t>9/27/19</a:t>
+              <a:t>9/28/19</a:t>
             </a:fld>
             <a:endParaRPr lang="en-US"/>
           </a:p>
@@ -1593,7 +1593,7 @@
           <a:p>
             <a:fld id="{B3C8DAF2-8992-D940-951E-CD71294AEB5F}" type="datetimeFigureOut">
               <a:rPr lang="en-US" smtClean="0"/>
-              <a:t>9/27/19</a:t>
+              <a:t>9/28/19</a:t>
             </a:fld>
             <a:endParaRPr lang="en-US"/>
           </a:p>
@@ -1960,7 +1960,7 @@
           <a:p>
             <a:fld id="{B3C8DAF2-8992-D940-951E-CD71294AEB5F}" type="datetimeFigureOut">
               <a:rPr lang="en-US" smtClean="0"/>
-              <a:t>9/27/19</a:t>
+              <a:t>9/28/19</a:t>
             </a:fld>
             <a:endParaRPr lang="en-US"/>
           </a:p>
@@ -2078,7 +2078,7 @@
           <a:p>
             <a:fld id="{B3C8DAF2-8992-D940-951E-CD71294AEB5F}" type="datetimeFigureOut">
               <a:rPr lang="en-US" smtClean="0"/>
-              <a:t>9/27/19</a:t>
+              <a:t>9/28/19</a:t>
             </a:fld>
             <a:endParaRPr lang="en-US"/>
           </a:p>
@@ -2173,7 +2173,7 @@
           <a:p>
             <a:fld id="{B3C8DAF2-8992-D940-951E-CD71294AEB5F}" type="datetimeFigureOut">
               <a:rPr lang="en-US" smtClean="0"/>
-              <a:t>9/27/19</a:t>
+              <a:t>9/28/19</a:t>
             </a:fld>
             <a:endParaRPr lang="en-US"/>
           </a:p>
@@ -2450,7 +2450,7 @@
           <a:p>
             <a:fld id="{B3C8DAF2-8992-D940-951E-CD71294AEB5F}" type="datetimeFigureOut">
               <a:rPr lang="en-US" smtClean="0"/>
-              <a:t>9/27/19</a:t>
+              <a:t>9/28/19</a:t>
             </a:fld>
             <a:endParaRPr lang="en-US"/>
           </a:p>
@@ -2707,7 +2707,7 @@
           <a:p>
             <a:fld id="{B3C8DAF2-8992-D940-951E-CD71294AEB5F}" type="datetimeFigureOut">
               <a:rPr lang="en-US" smtClean="0"/>
-              <a:t>9/27/19</a:t>
+              <a:t>9/28/19</a:t>
             </a:fld>
             <a:endParaRPr lang="en-US"/>
           </a:p>
@@ -2920,7 +2920,7 @@
           <a:p>
             <a:fld id="{B3C8DAF2-8992-D940-951E-CD71294AEB5F}" type="datetimeFigureOut">
               <a:rPr lang="en-US" smtClean="0"/>
-              <a:t>9/27/19</a:t>
+              <a:t>9/28/19</a:t>
             </a:fld>
             <a:endParaRPr lang="en-US"/>
           </a:p>
@@ -3813,302 +3813,355 @@
           <a:chExt cx="0" cy="0"/>
         </a:xfrm>
       </p:grpSpPr>
-      <p:pic>
-        <p:nvPicPr>
-          <p:cNvPr id="7" name="Picture 6">
+      <p:grpSp>
+        <p:nvGrpSpPr>
+          <p:cNvPr id="2" name="Group 1">
             <a:extLst>
               <a:ext uri="{FF2B5EF4-FFF2-40B4-BE49-F238E27FC236}">
-                <a16:creationId xmlns:a16="http://schemas.microsoft.com/office/drawing/2014/main" id="{39225182-7181-CE48-877A-B5DBB3BDDFEB}"/>
+                <a16:creationId xmlns:a16="http://schemas.microsoft.com/office/drawing/2014/main" id="{8282CDFC-2BA7-6B48-9B24-8C2E86A98990}"/>
               </a:ext>
             </a:extLst>
           </p:cNvPr>
-          <p:cNvPicPr>
-            <a:picLocks noChangeAspect="1"/>
-          </p:cNvPicPr>
+          <p:cNvGrpSpPr/>
           <p:nvPr/>
-        </p:nvPicPr>
-        <p:blipFill>
-          <a:blip r:embed="rId2"/>
-          <a:stretch>
-            <a:fillRect/>
-          </a:stretch>
-        </p:blipFill>
-        <p:spPr>
+        </p:nvGrpSpPr>
+        <p:grpSpPr>
           <a:xfrm>
-            <a:off x="3883028" y="209538"/>
-            <a:ext cx="2011680" cy="2011680"/>
+            <a:off x="1296778" y="193668"/>
+            <a:ext cx="6780422" cy="6522817"/>
+            <a:chOff x="1296778" y="193669"/>
+            <a:chExt cx="4543676" cy="4507650"/>
           </a:xfrm>
-          <a:prstGeom prst="rect">
-            <a:avLst/>
-          </a:prstGeom>
-          <a:solidFill>
-            <a:schemeClr val="bg1">
-              <a:lumMod val="75000"/>
-              <a:alpha val="74000"/>
-            </a:schemeClr>
-          </a:solidFill>
-          <a:ln>
+        </p:grpSpPr>
+        <p:pic>
+          <p:nvPicPr>
+            <p:cNvPr id="7" name="Picture 6">
+              <a:extLst>
+                <a:ext uri="{FF2B5EF4-FFF2-40B4-BE49-F238E27FC236}">
+                  <a16:creationId xmlns:a16="http://schemas.microsoft.com/office/drawing/2014/main" id="{39225182-7181-CE48-877A-B5DBB3BDDFEB}"/>
+                </a:ext>
+              </a:extLst>
+            </p:cNvPr>
+            <p:cNvPicPr>
+              <a:picLocks noChangeAspect="1"/>
+            </p:cNvPicPr>
+            <p:nvPr/>
+          </p:nvPicPr>
+          <p:blipFill>
+            <a:blip r:embed="rId2"/>
+            <a:stretch>
+              <a:fillRect/>
+            </a:stretch>
+          </p:blipFill>
+          <p:spPr>
+            <a:xfrm>
+              <a:off x="3665022" y="209538"/>
+              <a:ext cx="2175256" cy="2175256"/>
+            </a:xfrm>
+            <a:prstGeom prst="rect">
+              <a:avLst/>
+            </a:prstGeom>
             <a:solidFill>
-              <a:schemeClr val="tx1"/>
+              <a:schemeClr val="bg1">
+                <a:lumMod val="75000"/>
+                <a:alpha val="74000"/>
+              </a:schemeClr>
             </a:solidFill>
-          </a:ln>
-        </p:spPr>
-      </p:pic>
-      <p:pic>
-        <p:nvPicPr>
-          <p:cNvPr id="9" name="Picture 8">
-            <a:extLst>
-              <a:ext uri="{FF2B5EF4-FFF2-40B4-BE49-F238E27FC236}">
-                <a16:creationId xmlns:a16="http://schemas.microsoft.com/office/drawing/2014/main" id="{E9CF313C-3592-954B-87B3-232542565D9C}"/>
-              </a:ext>
-            </a:extLst>
-          </p:cNvPr>
-          <p:cNvPicPr>
-            <a:picLocks noChangeAspect="1"/>
-          </p:cNvPicPr>
-          <p:nvPr/>
-        </p:nvPicPr>
-        <p:blipFill>
-          <a:blip r:embed="rId3"/>
-          <a:stretch>
-            <a:fillRect/>
-          </a:stretch>
-        </p:blipFill>
-        <p:spPr>
-          <a:xfrm>
-            <a:off x="1329944" y="209538"/>
-            <a:ext cx="2011680" cy="2011680"/>
-          </a:xfrm>
-          <a:prstGeom prst="rect">
-            <a:avLst/>
-          </a:prstGeom>
-          <a:solidFill>
-            <a:schemeClr val="bg1">
-              <a:lumMod val="75000"/>
-              <a:alpha val="75000"/>
-            </a:schemeClr>
-          </a:solidFill>
-          <a:ln>
+            <a:ln>
+              <a:solidFill>
+                <a:schemeClr val="tx1"/>
+              </a:solidFill>
+            </a:ln>
+          </p:spPr>
+        </p:pic>
+        <p:pic>
+          <p:nvPicPr>
+            <p:cNvPr id="9" name="Picture 8">
+              <a:extLst>
+                <a:ext uri="{FF2B5EF4-FFF2-40B4-BE49-F238E27FC236}">
+                  <a16:creationId xmlns:a16="http://schemas.microsoft.com/office/drawing/2014/main" id="{E9CF313C-3592-954B-87B3-232542565D9C}"/>
+                </a:ext>
+              </a:extLst>
+            </p:cNvPr>
+            <p:cNvPicPr>
+              <a:picLocks noChangeAspect="1"/>
+            </p:cNvPicPr>
+            <p:nvPr/>
+          </p:nvPicPr>
+          <p:blipFill>
+            <a:blip r:embed="rId3"/>
+            <a:stretch>
+              <a:fillRect/>
+            </a:stretch>
+          </p:blipFill>
+          <p:spPr>
+            <a:xfrm>
+              <a:off x="1329944" y="209538"/>
+              <a:ext cx="2175256" cy="2175256"/>
+            </a:xfrm>
+            <a:prstGeom prst="rect">
+              <a:avLst/>
+            </a:prstGeom>
             <a:solidFill>
-              <a:schemeClr val="tx1"/>
+              <a:schemeClr val="bg1">
+                <a:lumMod val="75000"/>
+                <a:alpha val="75000"/>
+              </a:schemeClr>
             </a:solidFill>
-          </a:ln>
-        </p:spPr>
-      </p:pic>
-      <p:pic>
-        <p:nvPicPr>
-          <p:cNvPr id="13" name="Picture 12">
-            <a:extLst>
-              <a:ext uri="{FF2B5EF4-FFF2-40B4-BE49-F238E27FC236}">
-                <a16:creationId xmlns:a16="http://schemas.microsoft.com/office/drawing/2014/main" id="{6089858A-5DB1-9A4E-B5C3-5CBC409EFEBA}"/>
-              </a:ext>
-            </a:extLst>
-          </p:cNvPr>
-          <p:cNvPicPr>
-            <a:picLocks noChangeAspect="1"/>
-          </p:cNvPicPr>
-          <p:nvPr/>
-        </p:nvPicPr>
-        <p:blipFill>
-          <a:blip r:embed="rId4"/>
-          <a:stretch>
-            <a:fillRect/>
-          </a:stretch>
-        </p:blipFill>
-        <p:spPr>
-          <a:xfrm>
-            <a:off x="3883028" y="2512060"/>
-            <a:ext cx="2019569" cy="2011680"/>
-          </a:xfrm>
-          <a:prstGeom prst="rect">
-            <a:avLst/>
-          </a:prstGeom>
-        </p:spPr>
-      </p:pic>
-      <p:sp>
-        <p:nvSpPr>
-          <p:cNvPr id="14" name="TextBox 13">
-            <a:extLst>
-              <a:ext uri="{FF2B5EF4-FFF2-40B4-BE49-F238E27FC236}">
-                <a16:creationId xmlns:a16="http://schemas.microsoft.com/office/drawing/2014/main" id="{A8439637-5B41-D94C-8F01-092F8D3ABCC8}"/>
-              </a:ext>
-            </a:extLst>
-          </p:cNvPr>
-          <p:cNvSpPr txBox="1"/>
-          <p:nvPr/>
-        </p:nvSpPr>
-        <p:spPr>
-          <a:xfrm>
-            <a:off x="949384" y="177800"/>
-            <a:ext cx="325730" cy="307777"/>
-          </a:xfrm>
-          <a:prstGeom prst="rect">
-            <a:avLst/>
-          </a:prstGeom>
-          <a:solidFill>
-            <a:schemeClr val="bg1"/>
-          </a:solidFill>
-        </p:spPr>
-        <p:txBody>
-          <a:bodyPr wrap="none" rtlCol="0">
-            <a:spAutoFit/>
-          </a:bodyPr>
-          <a:lstStyle/>
-          <a:p>
-            <a:r>
-              <a:rPr lang="en-US" sz="1400" dirty="0"/>
-              <a:t>a)</a:t>
-            </a:r>
-          </a:p>
-        </p:txBody>
-      </p:sp>
-      <p:sp>
-        <p:nvSpPr>
-          <p:cNvPr id="25" name="TextBox 24">
-            <a:extLst>
-              <a:ext uri="{FF2B5EF4-FFF2-40B4-BE49-F238E27FC236}">
-                <a16:creationId xmlns:a16="http://schemas.microsoft.com/office/drawing/2014/main" id="{8F857C16-16AE-AC47-AC88-096B87829FDD}"/>
-              </a:ext>
-            </a:extLst>
-          </p:cNvPr>
-          <p:cNvSpPr txBox="1"/>
-          <p:nvPr/>
-        </p:nvSpPr>
-        <p:spPr>
-          <a:xfrm>
-            <a:off x="3535634" y="177800"/>
-            <a:ext cx="333746" cy="307777"/>
-          </a:xfrm>
-          <a:prstGeom prst="rect">
-            <a:avLst/>
-          </a:prstGeom>
-          <a:solidFill>
-            <a:schemeClr val="bg1"/>
-          </a:solidFill>
-        </p:spPr>
-        <p:txBody>
-          <a:bodyPr wrap="none" rtlCol="0">
-            <a:spAutoFit/>
-          </a:bodyPr>
-          <a:lstStyle/>
-          <a:p>
-            <a:r>
-              <a:rPr lang="en-US" sz="1400" dirty="0"/>
-              <a:t>b)</a:t>
-            </a:r>
-          </a:p>
-        </p:txBody>
-      </p:sp>
-      <p:sp>
-        <p:nvSpPr>
-          <p:cNvPr id="26" name="TextBox 25">
-            <a:extLst>
-              <a:ext uri="{FF2B5EF4-FFF2-40B4-BE49-F238E27FC236}">
-                <a16:creationId xmlns:a16="http://schemas.microsoft.com/office/drawing/2014/main" id="{255799CA-9648-0648-B770-71FE4A44E29F}"/>
-              </a:ext>
-            </a:extLst>
-          </p:cNvPr>
-          <p:cNvSpPr txBox="1"/>
-          <p:nvPr/>
-        </p:nvSpPr>
-        <p:spPr>
-          <a:xfrm>
-            <a:off x="949384" y="2512060"/>
-            <a:ext cx="314510" cy="307777"/>
-          </a:xfrm>
-          <a:prstGeom prst="rect">
-            <a:avLst/>
-          </a:prstGeom>
-          <a:solidFill>
-            <a:schemeClr val="bg1"/>
-          </a:solidFill>
-        </p:spPr>
-        <p:txBody>
-          <a:bodyPr wrap="none" rtlCol="0">
-            <a:spAutoFit/>
-          </a:bodyPr>
-          <a:lstStyle/>
-          <a:p>
-            <a:r>
-              <a:rPr lang="en-US" sz="1400" dirty="0"/>
-              <a:t>c)</a:t>
-            </a:r>
-          </a:p>
-        </p:txBody>
-      </p:sp>
-      <p:sp>
-        <p:nvSpPr>
-          <p:cNvPr id="27" name="TextBox 26">
-            <a:extLst>
-              <a:ext uri="{FF2B5EF4-FFF2-40B4-BE49-F238E27FC236}">
-                <a16:creationId xmlns:a16="http://schemas.microsoft.com/office/drawing/2014/main" id="{861E6DFE-F410-814A-BAE1-23BA38690491}"/>
-              </a:ext>
-            </a:extLst>
-          </p:cNvPr>
-          <p:cNvSpPr txBox="1"/>
-          <p:nvPr/>
-        </p:nvSpPr>
-        <p:spPr>
-          <a:xfrm>
-            <a:off x="3549282" y="2512060"/>
-            <a:ext cx="333746" cy="307777"/>
-          </a:xfrm>
-          <a:prstGeom prst="rect">
-            <a:avLst/>
-          </a:prstGeom>
-          <a:solidFill>
-            <a:schemeClr val="bg1"/>
-          </a:solidFill>
-        </p:spPr>
-        <p:txBody>
-          <a:bodyPr wrap="none" rtlCol="0">
-            <a:spAutoFit/>
-          </a:bodyPr>
-          <a:lstStyle/>
-          <a:p>
-            <a:r>
-              <a:rPr lang="en-US" sz="1400" dirty="0"/>
-              <a:t>d)</a:t>
-            </a:r>
-          </a:p>
-        </p:txBody>
-      </p:sp>
-      <p:pic>
-        <p:nvPicPr>
-          <p:cNvPr id="16" name="Picture 15">
-            <a:extLst>
-              <a:ext uri="{FF2B5EF4-FFF2-40B4-BE49-F238E27FC236}">
-                <a16:creationId xmlns:a16="http://schemas.microsoft.com/office/drawing/2014/main" id="{4E504FC2-B0E5-4743-A8E5-05586FAAA7A4}"/>
-              </a:ext>
-            </a:extLst>
-          </p:cNvPr>
-          <p:cNvPicPr>
-            <a:picLocks noChangeAspect="1"/>
-          </p:cNvPicPr>
-          <p:nvPr/>
-        </p:nvPicPr>
-        <p:blipFill>
-          <a:blip r:embed="rId5"/>
-          <a:stretch>
-            <a:fillRect/>
-          </a:stretch>
-        </p:blipFill>
-        <p:spPr>
-          <a:xfrm>
-            <a:off x="1311656" y="2512060"/>
-            <a:ext cx="2029968" cy="2026003"/>
-          </a:xfrm>
-          <a:prstGeom prst="rect">
-            <a:avLst/>
-          </a:prstGeom>
-          <a:solidFill>
-            <a:schemeClr val="bg1">
-              <a:lumMod val="75000"/>
-              <a:alpha val="74000"/>
-            </a:schemeClr>
-          </a:solidFill>
-        </p:spPr>
-      </p:pic>
+            <a:ln>
+              <a:solidFill>
+                <a:schemeClr val="tx1"/>
+              </a:solidFill>
+            </a:ln>
+          </p:spPr>
+        </p:pic>
+        <p:pic>
+          <p:nvPicPr>
+            <p:cNvPr id="13" name="Picture 12">
+              <a:extLst>
+                <a:ext uri="{FF2B5EF4-FFF2-40B4-BE49-F238E27FC236}">
+                  <a16:creationId xmlns:a16="http://schemas.microsoft.com/office/drawing/2014/main" id="{6089858A-5DB1-9A4E-B5C3-5CBC409EFEBA}"/>
+                </a:ext>
+              </a:extLst>
+            </p:cNvPr>
+            <p:cNvPicPr>
+              <a:picLocks noChangeAspect="1"/>
+            </p:cNvPicPr>
+            <p:nvPr/>
+          </p:nvPicPr>
+          <p:blipFill>
+            <a:blip r:embed="rId4"/>
+            <a:stretch>
+              <a:fillRect/>
+            </a:stretch>
+          </p:blipFill>
+          <p:spPr>
+            <a:xfrm>
+              <a:off x="3642610" y="2512059"/>
+              <a:ext cx="2197844" cy="2189259"/>
+            </a:xfrm>
+            <a:prstGeom prst="rect">
+              <a:avLst/>
+            </a:prstGeom>
+          </p:spPr>
+        </p:pic>
+        <p:sp>
+          <p:nvSpPr>
+            <p:cNvPr id="14" name="TextBox 13">
+              <a:extLst>
+                <a:ext uri="{FF2B5EF4-FFF2-40B4-BE49-F238E27FC236}">
+                  <a16:creationId xmlns:a16="http://schemas.microsoft.com/office/drawing/2014/main" id="{A8439637-5B41-D94C-8F01-092F8D3ABCC8}"/>
+                </a:ext>
+              </a:extLst>
+            </p:cNvPr>
+            <p:cNvSpPr txBox="1"/>
+            <p:nvPr/>
+          </p:nvSpPr>
+          <p:spPr>
+            <a:xfrm>
+              <a:off x="1351716" y="198652"/>
+              <a:ext cx="271228" cy="307777"/>
+            </a:xfrm>
+            <a:prstGeom prst="rect">
+              <a:avLst/>
+            </a:prstGeom>
+            <a:noFill/>
+          </p:spPr>
+          <p:txBody>
+            <a:bodyPr wrap="none" rtlCol="0">
+              <a:spAutoFit/>
+            </a:bodyPr>
+            <a:lstStyle/>
+            <a:p>
+              <a:r>
+                <a:rPr lang="en-US" sz="1400" dirty="0"/>
+                <a:t>a</a:t>
+              </a:r>
+            </a:p>
+          </p:txBody>
+        </p:sp>
+        <p:sp>
+          <p:nvSpPr>
+            <p:cNvPr id="25" name="TextBox 24">
+              <a:extLst>
+                <a:ext uri="{FF2B5EF4-FFF2-40B4-BE49-F238E27FC236}">
+                  <a16:creationId xmlns:a16="http://schemas.microsoft.com/office/drawing/2014/main" id="{8F857C16-16AE-AC47-AC88-096B87829FDD}"/>
+                </a:ext>
+              </a:extLst>
+            </p:cNvPr>
+            <p:cNvSpPr txBox="1"/>
+            <p:nvPr/>
+          </p:nvSpPr>
+          <p:spPr>
+            <a:xfrm>
+              <a:off x="3697968" y="193669"/>
+              <a:ext cx="279244" cy="307777"/>
+            </a:xfrm>
+            <a:prstGeom prst="rect">
+              <a:avLst/>
+            </a:prstGeom>
+            <a:noFill/>
+          </p:spPr>
+          <p:txBody>
+            <a:bodyPr wrap="square" rtlCol="0">
+              <a:spAutoFit/>
+            </a:bodyPr>
+            <a:lstStyle/>
+            <a:p>
+              <a:r>
+                <a:rPr lang="en-US" sz="1400" dirty="0"/>
+                <a:t>b</a:t>
+              </a:r>
+            </a:p>
+          </p:txBody>
+        </p:sp>
+        <p:sp>
+          <p:nvSpPr>
+            <p:cNvPr id="26" name="TextBox 25">
+              <a:extLst>
+                <a:ext uri="{FF2B5EF4-FFF2-40B4-BE49-F238E27FC236}">
+                  <a16:creationId xmlns:a16="http://schemas.microsoft.com/office/drawing/2014/main" id="{255799CA-9648-0648-B770-71FE4A44E29F}"/>
+                </a:ext>
+              </a:extLst>
+            </p:cNvPr>
+            <p:cNvSpPr txBox="1"/>
+            <p:nvPr/>
+          </p:nvSpPr>
+          <p:spPr>
+            <a:xfrm>
+              <a:off x="1296778" y="2527929"/>
+              <a:ext cx="314510" cy="307777"/>
+            </a:xfrm>
+            <a:prstGeom prst="rect">
+              <a:avLst/>
+            </a:prstGeom>
+            <a:noFill/>
+          </p:spPr>
+          <p:txBody>
+            <a:bodyPr wrap="none" rtlCol="0">
+              <a:spAutoFit/>
+            </a:bodyPr>
+            <a:lstStyle/>
+            <a:p>
+              <a:r>
+                <a:rPr lang="en-US" sz="1400" dirty="0"/>
+                <a:t>c)</a:t>
+              </a:r>
+            </a:p>
+          </p:txBody>
+        </p:sp>
+        <p:sp>
+          <p:nvSpPr>
+            <p:cNvPr id="27" name="TextBox 26">
+              <a:extLst>
+                <a:ext uri="{FF2B5EF4-FFF2-40B4-BE49-F238E27FC236}">
+                  <a16:creationId xmlns:a16="http://schemas.microsoft.com/office/drawing/2014/main" id="{861E6DFE-F410-814A-BAE1-23BA38690491}"/>
+                </a:ext>
+              </a:extLst>
+            </p:cNvPr>
+            <p:cNvSpPr txBox="1"/>
+            <p:nvPr/>
+          </p:nvSpPr>
+          <p:spPr>
+            <a:xfrm>
+              <a:off x="3689844" y="2527929"/>
+              <a:ext cx="279244" cy="307777"/>
+            </a:xfrm>
+            <a:prstGeom prst="rect">
+              <a:avLst/>
+            </a:prstGeom>
+            <a:noFill/>
+          </p:spPr>
+          <p:txBody>
+            <a:bodyPr wrap="none" rtlCol="0">
+              <a:spAutoFit/>
+            </a:bodyPr>
+            <a:lstStyle/>
+            <a:p>
+              <a:r>
+                <a:rPr lang="en-US" sz="1400" dirty="0">
+                  <a:solidFill>
+                    <a:schemeClr val="bg1"/>
+                  </a:solidFill>
+                </a:rPr>
+                <a:t>d</a:t>
+              </a:r>
+              <a:endParaRPr lang="en-US" sz="1400" dirty="0"/>
+            </a:p>
+          </p:txBody>
+        </p:sp>
+        <p:pic>
+          <p:nvPicPr>
+            <p:cNvPr id="16" name="Picture 15">
+              <a:extLst>
+                <a:ext uri="{FF2B5EF4-FFF2-40B4-BE49-F238E27FC236}">
+                  <a16:creationId xmlns:a16="http://schemas.microsoft.com/office/drawing/2014/main" id="{4E504FC2-B0E5-4743-A8E5-05586FAAA7A4}"/>
+                </a:ext>
+              </a:extLst>
+            </p:cNvPr>
+            <p:cNvPicPr>
+              <a:picLocks noChangeAspect="1"/>
+            </p:cNvPicPr>
+            <p:nvPr/>
+          </p:nvPicPr>
+          <p:blipFill>
+            <a:blip r:embed="rId5"/>
+            <a:stretch>
+              <a:fillRect/>
+            </a:stretch>
+          </p:blipFill>
+          <p:spPr>
+            <a:xfrm>
+              <a:off x="1311656" y="2512060"/>
+              <a:ext cx="2193544" cy="2189259"/>
+            </a:xfrm>
+            <a:prstGeom prst="rect">
+              <a:avLst/>
+            </a:prstGeom>
+            <a:solidFill>
+              <a:schemeClr val="bg1">
+                <a:lumMod val="75000"/>
+                <a:alpha val="74000"/>
+              </a:schemeClr>
+            </a:solidFill>
+          </p:spPr>
+        </p:pic>
+        <p:sp>
+          <p:nvSpPr>
+            <p:cNvPr id="10" name="TextBox 9">
+              <a:extLst>
+                <a:ext uri="{FF2B5EF4-FFF2-40B4-BE49-F238E27FC236}">
+                  <a16:creationId xmlns:a16="http://schemas.microsoft.com/office/drawing/2014/main" id="{9283E4A7-315B-D043-85C8-CA0AD37B5962}"/>
+                </a:ext>
+              </a:extLst>
+            </p:cNvPr>
+            <p:cNvSpPr txBox="1"/>
+            <p:nvPr/>
+          </p:nvSpPr>
+          <p:spPr>
+            <a:xfrm>
+              <a:off x="1338533" y="2527928"/>
+              <a:ext cx="260008" cy="307777"/>
+            </a:xfrm>
+            <a:prstGeom prst="rect">
+              <a:avLst/>
+            </a:prstGeom>
+            <a:noFill/>
+          </p:spPr>
+          <p:txBody>
+            <a:bodyPr wrap="none" rtlCol="0">
+              <a:spAutoFit/>
+            </a:bodyPr>
+            <a:lstStyle/>
+            <a:p>
+              <a:r>
+                <a:rPr lang="en-US" sz="1400" dirty="0"/>
+                <a:t>c</a:t>
+              </a:r>
+            </a:p>
+          </p:txBody>
+        </p:sp>
+      </p:grpSp>
     </p:spTree>
     <p:extLst>
       <p:ext uri="{BB962C8B-B14F-4D97-AF65-F5344CB8AC3E}">

</xml_diff>